<commit_message>
tweaks to deck based on first delivery
</commit_message>
<xml_diff>
--- a/90% of what you need to know in 75% of an hour.pptx
+++ b/90% of what you need to know in 75% of an hour.pptx
@@ -273,7 +273,7 @@
           <a:p>
             <a:fld id="{8C1E1FAD-7351-4908-963A-08EA8E4AB7A0}" type="datetimeFigureOut">
               <a:rPr lang="en-US" smtClean="0"/>
-              <a:t>5/10/2022</a:t>
+              <a:t>5/11/2022</a:t>
             </a:fld>
             <a:endParaRPr lang="en-US"/>
           </a:p>
@@ -471,7 +471,7 @@
           <a:p>
             <a:fld id="{8C1E1FAD-7351-4908-963A-08EA8E4AB7A0}" type="datetimeFigureOut">
               <a:rPr lang="en-US" smtClean="0"/>
-              <a:t>5/10/2022</a:t>
+              <a:t>5/11/2022</a:t>
             </a:fld>
             <a:endParaRPr lang="en-US"/>
           </a:p>
@@ -679,7 +679,7 @@
           <a:p>
             <a:fld id="{8C1E1FAD-7351-4908-963A-08EA8E4AB7A0}" type="datetimeFigureOut">
               <a:rPr lang="en-US" smtClean="0"/>
-              <a:t>5/10/2022</a:t>
+              <a:t>5/11/2022</a:t>
             </a:fld>
             <a:endParaRPr lang="en-US"/>
           </a:p>
@@ -908,7 +908,7 @@
           <a:p>
             <a:fld id="{8C1E1FAD-7351-4908-963A-08EA8E4AB7A0}" type="datetimeFigureOut">
               <a:rPr lang="en-US" smtClean="0"/>
-              <a:t>5/10/2022</a:t>
+              <a:t>5/11/2022</a:t>
             </a:fld>
             <a:endParaRPr lang="en-US"/>
           </a:p>
@@ -1185,7 +1185,7 @@
           <a:p>
             <a:fld id="{8C1E1FAD-7351-4908-963A-08EA8E4AB7A0}" type="datetimeFigureOut">
               <a:rPr lang="en-US" smtClean="0"/>
-              <a:t>5/10/2022</a:t>
+              <a:t>5/11/2022</a:t>
             </a:fld>
             <a:endParaRPr lang="en-US"/>
           </a:p>
@@ -1450,7 +1450,7 @@
           <a:p>
             <a:fld id="{8C1E1FAD-7351-4908-963A-08EA8E4AB7A0}" type="datetimeFigureOut">
               <a:rPr lang="en-US" smtClean="0"/>
-              <a:t>5/10/2022</a:t>
+              <a:t>5/11/2022</a:t>
             </a:fld>
             <a:endParaRPr lang="en-US"/>
           </a:p>
@@ -1866,7 +1866,7 @@
           <a:p>
             <a:fld id="{8C1E1FAD-7351-4908-963A-08EA8E4AB7A0}" type="datetimeFigureOut">
               <a:rPr lang="en-US" smtClean="0"/>
-              <a:t>5/10/2022</a:t>
+              <a:t>5/11/2022</a:t>
             </a:fld>
             <a:endParaRPr lang="en-US"/>
           </a:p>
@@ -2012,7 +2012,7 @@
           <a:p>
             <a:fld id="{8C1E1FAD-7351-4908-963A-08EA8E4AB7A0}" type="datetimeFigureOut">
               <a:rPr lang="en-US" smtClean="0"/>
-              <a:t>5/10/2022</a:t>
+              <a:t>5/11/2022</a:t>
             </a:fld>
             <a:endParaRPr lang="en-US"/>
           </a:p>
@@ -2125,7 +2125,7 @@
           <a:p>
             <a:fld id="{8C1E1FAD-7351-4908-963A-08EA8E4AB7A0}" type="datetimeFigureOut">
               <a:rPr lang="en-US" smtClean="0"/>
-              <a:t>5/10/2022</a:t>
+              <a:t>5/11/2022</a:t>
             </a:fld>
             <a:endParaRPr lang="en-US"/>
           </a:p>
@@ -2440,7 +2440,7 @@
           <a:p>
             <a:fld id="{8C1E1FAD-7351-4908-963A-08EA8E4AB7A0}" type="datetimeFigureOut">
               <a:rPr lang="en-US" smtClean="0"/>
-              <a:t>5/10/2022</a:t>
+              <a:t>5/11/2022</a:t>
             </a:fld>
             <a:endParaRPr lang="en-US"/>
           </a:p>
@@ -2733,7 +2733,7 @@
           <a:p>
             <a:fld id="{8C1E1FAD-7351-4908-963A-08EA8E4AB7A0}" type="datetimeFigureOut">
               <a:rPr lang="en-US" smtClean="0"/>
-              <a:t>5/10/2022</a:t>
+              <a:t>5/11/2022</a:t>
             </a:fld>
             <a:endParaRPr lang="en-US"/>
           </a:p>
@@ -2972,7 +2972,7 @@
           <a:p>
             <a:fld id="{8C1E1FAD-7351-4908-963A-08EA8E4AB7A0}" type="datetimeFigureOut">
               <a:rPr lang="en-US" smtClean="0"/>
-              <a:t>5/10/2022</a:t>
+              <a:t>5/11/2022</a:t>
             </a:fld>
             <a:endParaRPr lang="en-US"/>
           </a:p>
@@ -4611,6 +4611,50 @@
           </a:p>
         </p:txBody>
       </p:sp>
+      <p:sp>
+        <p:nvSpPr>
+          <p:cNvPr id="4" name="TextBox 3">
+            <a:extLst>
+              <a:ext uri="{FF2B5EF4-FFF2-40B4-BE49-F238E27FC236}">
+                <a16:creationId xmlns:a16="http://schemas.microsoft.com/office/drawing/2014/main" id="{63B3FBAF-4B4F-4394-747C-1F5355FB3596}"/>
+              </a:ext>
+            </a:extLst>
+          </p:cNvPr>
+          <p:cNvSpPr txBox="1"/>
+          <p:nvPr/>
+        </p:nvSpPr>
+        <p:spPr>
+          <a:xfrm>
+            <a:off x="7079649" y="2877893"/>
+            <a:ext cx="4299857" cy="1754326"/>
+          </a:xfrm>
+          <a:prstGeom prst="rect">
+            <a:avLst/>
+          </a:prstGeom>
+          <a:noFill/>
+        </p:spPr>
+        <p:txBody>
+          <a:bodyPr wrap="square" rtlCol="0">
+            <a:spAutoFit/>
+          </a:bodyPr>
+          <a:lstStyle/>
+          <a:p>
+            <a:r>
+              <a:rPr lang="en-US" dirty="0" err="1">
+                <a:hlinkClick r:id="rId2"/>
+              </a:rPr>
+              <a:t>EvanBasalik</a:t>
+            </a:r>
+            <a:r>
+              <a:rPr lang="en-US" dirty="0">
+                <a:hlinkClick r:id="rId2"/>
+              </a:rPr>
+              <a:t>/90PercentofKustoin75PercentofanHour: A set of demo queries that will teach you 90% of what you need to know about Kusto/Azure Data Explorer in 75% of an hour (github.com)</a:t>
+            </a:r>
+            <a:endParaRPr lang="en-US" dirty="0"/>
+          </a:p>
+        </p:txBody>
+      </p:sp>
     </p:spTree>
     <p:extLst>
       <p:ext uri="{BB962C8B-B14F-4D97-AF65-F5344CB8AC3E}">

</xml_diff>

<commit_message>
Update deck to fix the stale title page comments
</commit_message>
<xml_diff>
--- a/90% of what you need to know in 75% of an hour.pptx
+++ b/90% of what you need to know in 75% of an hour.pptx
@@ -273,7 +273,7 @@
           <a:p>
             <a:fld id="{8C1E1FAD-7351-4908-963A-08EA8E4AB7A0}" type="datetimeFigureOut">
               <a:rPr lang="en-US" smtClean="0"/>
-              <a:t>5/11/2022</a:t>
+              <a:t>9/14/2023</a:t>
             </a:fld>
             <a:endParaRPr lang="en-US"/>
           </a:p>
@@ -471,7 +471,7 @@
           <a:p>
             <a:fld id="{8C1E1FAD-7351-4908-963A-08EA8E4AB7A0}" type="datetimeFigureOut">
               <a:rPr lang="en-US" smtClean="0"/>
-              <a:t>5/11/2022</a:t>
+              <a:t>9/14/2023</a:t>
             </a:fld>
             <a:endParaRPr lang="en-US"/>
           </a:p>
@@ -679,7 +679,7 @@
           <a:p>
             <a:fld id="{8C1E1FAD-7351-4908-963A-08EA8E4AB7A0}" type="datetimeFigureOut">
               <a:rPr lang="en-US" smtClean="0"/>
-              <a:t>5/11/2022</a:t>
+              <a:t>9/14/2023</a:t>
             </a:fld>
             <a:endParaRPr lang="en-US"/>
           </a:p>
@@ -908,7 +908,7 @@
           <a:p>
             <a:fld id="{8C1E1FAD-7351-4908-963A-08EA8E4AB7A0}" type="datetimeFigureOut">
               <a:rPr lang="en-US" smtClean="0"/>
-              <a:t>5/11/2022</a:t>
+              <a:t>9/14/2023</a:t>
             </a:fld>
             <a:endParaRPr lang="en-US"/>
           </a:p>
@@ -1185,7 +1185,7 @@
           <a:p>
             <a:fld id="{8C1E1FAD-7351-4908-963A-08EA8E4AB7A0}" type="datetimeFigureOut">
               <a:rPr lang="en-US" smtClean="0"/>
-              <a:t>5/11/2022</a:t>
+              <a:t>9/14/2023</a:t>
             </a:fld>
             <a:endParaRPr lang="en-US"/>
           </a:p>
@@ -1450,7 +1450,7 @@
           <a:p>
             <a:fld id="{8C1E1FAD-7351-4908-963A-08EA8E4AB7A0}" type="datetimeFigureOut">
               <a:rPr lang="en-US" smtClean="0"/>
-              <a:t>5/11/2022</a:t>
+              <a:t>9/14/2023</a:t>
             </a:fld>
             <a:endParaRPr lang="en-US"/>
           </a:p>
@@ -1866,7 +1866,7 @@
           <a:p>
             <a:fld id="{8C1E1FAD-7351-4908-963A-08EA8E4AB7A0}" type="datetimeFigureOut">
               <a:rPr lang="en-US" smtClean="0"/>
-              <a:t>5/11/2022</a:t>
+              <a:t>9/14/2023</a:t>
             </a:fld>
             <a:endParaRPr lang="en-US"/>
           </a:p>
@@ -2012,7 +2012,7 @@
           <a:p>
             <a:fld id="{8C1E1FAD-7351-4908-963A-08EA8E4AB7A0}" type="datetimeFigureOut">
               <a:rPr lang="en-US" smtClean="0"/>
-              <a:t>5/11/2022</a:t>
+              <a:t>9/14/2023</a:t>
             </a:fld>
             <a:endParaRPr lang="en-US"/>
           </a:p>
@@ -2125,7 +2125,7 @@
           <a:p>
             <a:fld id="{8C1E1FAD-7351-4908-963A-08EA8E4AB7A0}" type="datetimeFigureOut">
               <a:rPr lang="en-US" smtClean="0"/>
-              <a:t>5/11/2022</a:t>
+              <a:t>9/14/2023</a:t>
             </a:fld>
             <a:endParaRPr lang="en-US"/>
           </a:p>
@@ -2440,7 +2440,7 @@
           <a:p>
             <a:fld id="{8C1E1FAD-7351-4908-963A-08EA8E4AB7A0}" type="datetimeFigureOut">
               <a:rPr lang="en-US" smtClean="0"/>
-              <a:t>5/11/2022</a:t>
+              <a:t>9/14/2023</a:t>
             </a:fld>
             <a:endParaRPr lang="en-US"/>
           </a:p>
@@ -2733,7 +2733,7 @@
           <a:p>
             <a:fld id="{8C1E1FAD-7351-4908-963A-08EA8E4AB7A0}" type="datetimeFigureOut">
               <a:rPr lang="en-US" smtClean="0"/>
-              <a:t>5/11/2022</a:t>
+              <a:t>9/14/2023</a:t>
             </a:fld>
             <a:endParaRPr lang="en-US"/>
           </a:p>
@@ -2972,7 +2972,7 @@
           <a:p>
             <a:fld id="{8C1E1FAD-7351-4908-963A-08EA8E4AB7A0}" type="datetimeFigureOut">
               <a:rPr lang="en-US" smtClean="0"/>
-              <a:t>5/11/2022</a:t>
+              <a:t>9/14/2023</a:t>
             </a:fld>
             <a:endParaRPr lang="en-US"/>
           </a:p>
@@ -4288,73 +4288,6 @@
       </p:grpSp>
       <p:sp>
         <p:nvSpPr>
-          <p:cNvPr id="6" name="Subtitle 5">
-            <a:extLst>
-              <a:ext uri="{FF2B5EF4-FFF2-40B4-BE49-F238E27FC236}">
-                <a16:creationId xmlns:a16="http://schemas.microsoft.com/office/drawing/2014/main" id="{DBD8BAA5-4796-2B29-CE44-333C1F85623E}"/>
-              </a:ext>
-            </a:extLst>
-          </p:cNvPr>
-          <p:cNvSpPr>
-            <a:spLocks noGrp="1"/>
-          </p:cNvSpPr>
-          <p:nvPr>
-            <p:ph type="subTitle" idx="1"/>
-          </p:nvPr>
-        </p:nvSpPr>
-        <p:spPr>
-          <a:xfrm>
-            <a:off x="6805525" y="5630676"/>
-            <a:ext cx="4610100" cy="942065"/>
-          </a:xfrm>
-        </p:spPr>
-        <p:txBody>
-          <a:bodyPr/>
-          <a:lstStyle/>
-          <a:p>
-            <a:r>
-              <a:rPr lang="en-US" dirty="0">
-                <a:highlight>
-                  <a:srgbClr val="FFFF00"/>
-                </a:highlight>
-              </a:rPr>
-              <a:t>Or 50% of an hour if you believe our </a:t>
-            </a:r>
-            <a:r>
-              <a:rPr lang="en-US" dirty="0" err="1">
-                <a:highlight>
-                  <a:srgbClr val="FFFF00"/>
-                </a:highlight>
-              </a:rPr>
-              <a:t>DoL</a:t>
-            </a:r>
-            <a:r>
-              <a:rPr lang="en-US" dirty="0">
-                <a:highlight>
-                  <a:srgbClr val="FFFF00"/>
-                </a:highlight>
-              </a:rPr>
-              <a:t> agenda </a:t>
-            </a:r>
-            <a:r>
-              <a:rPr lang="en-US" dirty="0">
-                <a:highlight>
-                  <a:srgbClr val="FFFF00"/>
-                </a:highlight>
-                <a:sym typeface="Wingdings" panose="05000000000000000000" pitchFamily="2" charset="2"/>
-              </a:rPr>
-              <a:t></a:t>
-            </a:r>
-            <a:endParaRPr lang="en-US" dirty="0">
-              <a:highlight>
-                <a:srgbClr val="FFFF00"/>
-              </a:highlight>
-            </a:endParaRPr>
-          </a:p>
-        </p:txBody>
-      </p:sp>
-      <p:sp>
-        <p:nvSpPr>
           <p:cNvPr id="7" name="TextBox 6">
             <a:extLst>
               <a:ext uri="{FF2B5EF4-FFF2-40B4-BE49-F238E27FC236}">
@@ -4436,6 +4369,31 @@
               <a:rPr lang="en-US" dirty="0"/>
               <a:t>Day of Learning</a:t>
             </a:r>
+          </a:p>
+        </p:txBody>
+      </p:sp>
+      <p:sp>
+        <p:nvSpPr>
+          <p:cNvPr id="8" name="Subtitle 7">
+            <a:extLst>
+              <a:ext uri="{FF2B5EF4-FFF2-40B4-BE49-F238E27FC236}">
+                <a16:creationId xmlns:a16="http://schemas.microsoft.com/office/drawing/2014/main" id="{195655E0-6287-A4C0-34C0-37EB4E769DA7}"/>
+              </a:ext>
+            </a:extLst>
+          </p:cNvPr>
+          <p:cNvSpPr>
+            <a:spLocks noGrp="1"/>
+          </p:cNvSpPr>
+          <p:nvPr>
+            <p:ph type="subTitle" idx="1"/>
+          </p:nvPr>
+        </p:nvSpPr>
+        <p:spPr/>
+        <p:txBody>
+          <a:bodyPr/>
+          <a:lstStyle/>
+          <a:p>
+            <a:endParaRPr lang="en-US"/>
           </a:p>
         </p:txBody>
       </p:sp>

</xml_diff>